<commit_message>
new version with download wizard
</commit_message>
<xml_diff>
--- a/presentations/2017/inspire/ngr-inspire-2017.pptx
+++ b/presentations/2017/inspire/ngr-inspire-2017.pptx
@@ -1864,7 +1864,7 @@
               <a:defRPr sz="1700"/>
             </a:pPr>
             <a:r>
-              <a:t>September 2017, Strassbourg</a:t>
+              <a:t>September 2017, Strasbourg</a:t>
             </a:r>
           </a:p>
           <a:p>
@@ -2926,10 +2926,11 @@
             <a:pPr/>
           </a:p>
           <a:p>
-            <a:pPr/>
-          </a:p>
-          <a:p>
-            <a:pPr/>
+            <a:pPr marL="0" indent="0" algn="ctr">
+              <a:buSzTx/>
+              <a:buFontTx/>
+              <a:buNone/>
+            </a:pPr>
             <a:r>
               <a:t>http://nationaalgeoregister.nl</a:t>
             </a:r>
@@ -3167,7 +3168,7 @@
         <p:spPr>
           <a:xfrm>
             <a:off x="1591587" y="1291788"/>
-            <a:ext cx="6104521" cy="1177929"/>
+            <a:ext cx="6104522" cy="1177929"/>
           </a:xfrm>
           <a:prstGeom prst="rect">
             <a:avLst/>
@@ -3250,8 +3251,8 @@
         </p:nvSpPr>
         <p:spPr>
           <a:xfrm>
-            <a:off x="214795" y="2909403"/>
-            <a:ext cx="1911652" cy="1039194"/>
+            <a:off x="282207" y="3121580"/>
+            <a:ext cx="1911652" cy="1039193"/>
           </a:xfrm>
           <a:prstGeom prst="rect">
             <a:avLst/>
@@ -3375,8 +3376,8 @@
         </p:nvSpPr>
         <p:spPr>
           <a:xfrm>
-            <a:off x="6412395" y="3248090"/>
-            <a:ext cx="1911652" cy="839019"/>
+            <a:off x="6412395" y="3184590"/>
+            <a:ext cx="1911652" cy="1039193"/>
           </a:xfrm>
           <a:prstGeom prst="rect">
             <a:avLst/>
@@ -3514,7 +3515,7 @@
           <p:nvPr/>
         </p:nvSpPr>
         <p:spPr>
-          <a:xfrm flipH="1" flipV="1">
+          <a:xfrm flipH="1">
             <a:off x="5312776" y="3683589"/>
             <a:ext cx="1096947" cy="1"/>
           </a:xfrm>
@@ -3764,45 +3765,6 @@
           <p:nvPr/>
         </p:nvSpPr>
         <p:spPr>
-          <a:xfrm>
-            <a:off x="1676430" y="2982908"/>
-            <a:ext cx="1" cy="359177"/>
-          </a:xfrm>
-          <a:prstGeom prst="line">
-            <a:avLst/>
-          </a:prstGeom>
-          <a:ln w="12700">
-            <a:solidFill>
-              <a:srgbClr val="78AAB3"/>
-            </a:solidFill>
-            <a:tailEnd type="triangle"/>
-          </a:ln>
-        </p:spPr>
-        <p:txBody>
-          <a:bodyPr lIns="32146" tIns="32146" rIns="32146" bIns="32146"/>
-          <a:lstStyle/>
-          <a:p>
-            <a:pPr algn="ctr" defTabSz="410765">
-              <a:defRPr sz="2400">
-                <a:solidFill>
-                  <a:srgbClr val="535353"/>
-                </a:solidFill>
-                <a:latin typeface="Helvetica Neue"/>
-                <a:ea typeface="Helvetica Neue"/>
-                <a:cs typeface="Helvetica Neue"/>
-                <a:sym typeface="Helvetica Neue"/>
-              </a:defRPr>
-            </a:pPr>
-          </a:p>
-        </p:txBody>
-      </p:sp>
-      <p:sp>
-        <p:nvSpPr>
-          <p:cNvPr id="59" name="Line"/>
-          <p:cNvSpPr/>
-          <p:nvPr/>
-        </p:nvSpPr>
-        <p:spPr>
           <a:xfrm flipH="1">
             <a:off x="2444147" y="4185618"/>
             <a:ext cx="1358093" cy="640186"/>
@@ -3837,7 +3799,7 @@
       </p:sp>
       <p:sp>
         <p:nvSpPr>
-          <p:cNvPr id="60" name="Line"/>
+          <p:cNvPr id="59" name="Line"/>
           <p:cNvSpPr/>
           <p:nvPr/>
         </p:nvSpPr>
@@ -3876,7 +3838,7 @@
       </p:sp>
       <p:sp>
         <p:nvSpPr>
-          <p:cNvPr id="61" name="Line"/>
+          <p:cNvPr id="60" name="Line"/>
           <p:cNvSpPr/>
           <p:nvPr/>
         </p:nvSpPr>
@@ -3915,14 +3877,14 @@
       </p:sp>
       <p:sp>
         <p:nvSpPr>
-          <p:cNvPr id="62" name="Line"/>
+          <p:cNvPr id="61" name="Line"/>
           <p:cNvSpPr/>
           <p:nvPr/>
         </p:nvSpPr>
         <p:spPr>
           <a:xfrm>
-            <a:off x="4481108" y="4150929"/>
-            <a:ext cx="1" cy="705792"/>
+            <a:off x="4481108" y="4150930"/>
+            <a:ext cx="1" cy="705791"/>
           </a:xfrm>
           <a:prstGeom prst="line">
             <a:avLst/>
@@ -3954,7 +3916,7 @@
       </p:sp>
       <p:sp>
         <p:nvSpPr>
-          <p:cNvPr id="63" name="Open data Portal"/>
+          <p:cNvPr id="62" name="Open data Portal"/>
           <p:cNvSpPr/>
           <p:nvPr/>
         </p:nvSpPr>
@@ -4005,14 +3967,14 @@
       </p:sp>
       <p:sp>
         <p:nvSpPr>
-          <p:cNvPr id="64" name="Line"/>
+          <p:cNvPr id="63" name="Line"/>
           <p:cNvSpPr/>
           <p:nvPr/>
         </p:nvSpPr>
         <p:spPr>
           <a:xfrm>
-            <a:off x="5075676" y="4153230"/>
-            <a:ext cx="1805850" cy="666775"/>
+            <a:off x="5075676" y="4153229"/>
+            <a:ext cx="1805850" cy="666776"/>
           </a:xfrm>
           <a:prstGeom prst="line">
             <a:avLst/>
@@ -4044,7 +4006,7 @@
       </p:sp>
       <p:sp>
         <p:nvSpPr>
-          <p:cNvPr id="65" name="Search engines"/>
+          <p:cNvPr id="64" name="Search engines"/>
           <p:cNvSpPr/>
           <p:nvPr/>
         </p:nvSpPr>
@@ -4095,7 +4057,7 @@
       </p:sp>
       <p:sp>
         <p:nvSpPr>
-          <p:cNvPr id="66" name="Manual registration"/>
+          <p:cNvPr id="65" name="Manual registration"/>
           <p:cNvSpPr/>
           <p:nvPr/>
         </p:nvSpPr>
@@ -4172,7 +4134,7 @@
       </p:grpSpPr>
       <p:sp>
         <p:nvSpPr>
-          <p:cNvPr id="68" name="Main functionalities"/>
+          <p:cNvPr id="67" name="Main functionalities"/>
           <p:cNvSpPr txBox="1"/>
           <p:nvPr>
             <p:ph type="title"/>
@@ -4196,7 +4158,7 @@
       </p:sp>
       <p:sp>
         <p:nvSpPr>
-          <p:cNvPr id="69" name="Quick Search…"/>
+          <p:cNvPr id="68" name="Quick Search…"/>
           <p:cNvSpPr txBox="1"/>
           <p:nvPr>
             <p:ph type="body" idx="1"/>
@@ -4301,11 +4263,24 @@
               <a:t>Configuration management</a:t>
             </a:r>
           </a:p>
+          <a:p>
+            <a:pPr marL="180473" indent="-180473">
+              <a:spcBef>
+                <a:spcPts val="0"/>
+              </a:spcBef>
+              <a:buFontTx/>
+              <a:buChar char="•"/>
+              <a:defRPr spc="-1"/>
+            </a:pPr>
+            <a:r>
+              <a:t>WFS download wizard</a:t>
+            </a:r>
+          </a:p>
         </p:txBody>
       </p:sp>
       <p:pic>
         <p:nvPicPr>
-          <p:cNvPr id="70" name="Screen Shot 2017-08-28 at 21.26.13.png" descr="Screen Shot 2017-08-28 at 21.26.13.png"/>
+          <p:cNvPr id="69" name="Screen Shot 2017-08-28 at 21.26.13.png" descr="Screen Shot 2017-08-28 at 21.26.13.png"/>
           <p:cNvPicPr>
             <a:picLocks noChangeAspect="1"/>
           </p:cNvPicPr>
@@ -4322,8 +4297,8 @@
         </p:blipFill>
         <p:spPr>
           <a:xfrm>
-            <a:off x="6082278" y="1077165"/>
-            <a:ext cx="3061968" cy="5257976"/>
+            <a:off x="6082277" y="1077165"/>
+            <a:ext cx="3061969" cy="5257976"/>
           </a:xfrm>
           <a:prstGeom prst="rect">
             <a:avLst/>
@@ -4342,7 +4317,7 @@
       </p:pic>
       <p:pic>
         <p:nvPicPr>
-          <p:cNvPr id="71" name="Screen Shot 2017-09-06 at 00.08.08.png" descr="Screen Shot 2017-09-06 at 00.08.08.png"/>
+          <p:cNvPr id="70" name="Screen Shot 2017-09-06 at 00.08.08.png" descr="Screen Shot 2017-09-06 at 00.08.08.png"/>
           <p:cNvPicPr>
             <a:picLocks noChangeAspect="1"/>
           </p:cNvPicPr>
@@ -4371,7 +4346,7 @@
       </p:pic>
       <p:pic>
         <p:nvPicPr>
-          <p:cNvPr id="72" name="Screen Shot 2017-09-06 at 00.10.09.png" descr="Screen Shot 2017-09-06 at 00.10.09.png"/>
+          <p:cNvPr id="71" name="Screen Shot 2017-09-06 at 00.10.09.png" descr="Screen Shot 2017-09-06 at 00.10.09.png"/>
           <p:cNvPicPr>
             <a:picLocks noChangeAspect="1"/>
           </p:cNvPicPr>
@@ -4387,8 +4362,8 @@
         </p:blipFill>
         <p:spPr>
           <a:xfrm>
-            <a:off x="6059483" y="1068628"/>
-            <a:ext cx="3061892" cy="5248956"/>
+            <a:off x="6059484" y="1068628"/>
+            <a:ext cx="3061891" cy="5248956"/>
           </a:xfrm>
           <a:prstGeom prst="rect">
             <a:avLst/>
@@ -4400,7 +4375,7 @@
       </p:pic>
       <p:pic>
         <p:nvPicPr>
-          <p:cNvPr id="73" name="Screen Shot 2017-09-06 at 00.12.19.png" descr="Screen Shot 2017-09-06 at 00.12.19.png"/>
+          <p:cNvPr id="72" name="Screen Shot 2017-09-06 at 00.12.19.png" descr="Screen Shot 2017-09-06 at 00.12.19.png"/>
           <p:cNvPicPr>
             <a:picLocks noChangeAspect="1"/>
           </p:cNvPicPr>
@@ -4430,7 +4405,7 @@
       </p:pic>
       <p:pic>
         <p:nvPicPr>
-          <p:cNvPr id="74" name="Screen Shot 2017-09-06 at 00.13.07.png" descr="Screen Shot 2017-09-06 at 00.13.07.png"/>
+          <p:cNvPr id="73" name="Screen Shot 2017-09-06 at 00.13.07.png" descr="Screen Shot 2017-09-06 at 00.13.07.png"/>
           <p:cNvPicPr>
             <a:picLocks noChangeAspect="1"/>
           </p:cNvPicPr>
@@ -4460,7 +4435,7 @@
       </p:pic>
       <p:pic>
         <p:nvPicPr>
-          <p:cNvPr id="75" name="Screen Shot 2017-09-06 at 00.14.34.png" descr="Screen Shot 2017-09-06 at 00.14.34.png"/>
+          <p:cNvPr id="74" name="Screen Shot 2017-09-06 at 00.14.34.png" descr="Screen Shot 2017-09-06 at 00.14.34.png"/>
           <p:cNvPicPr>
             <a:picLocks noChangeAspect="1"/>
           </p:cNvPicPr>
@@ -4477,8 +4452,8 @@
         </p:blipFill>
         <p:spPr>
           <a:xfrm>
-            <a:off x="6029631" y="1066799"/>
-            <a:ext cx="3121597" cy="5267939"/>
+            <a:off x="6029631" y="1066800"/>
+            <a:ext cx="3121597" cy="5267938"/>
           </a:xfrm>
           <a:prstGeom prst="rect">
             <a:avLst/>
@@ -4490,7 +4465,7 @@
       </p:pic>
       <p:pic>
         <p:nvPicPr>
-          <p:cNvPr id="76" name="Screen Shot 2017-09-06 at 00.14.53.png" descr="Screen Shot 2017-09-06 at 00.14.53.png"/>
+          <p:cNvPr id="75" name="Screen Shot 2017-09-06 at 00.14.53.png" descr="Screen Shot 2017-09-06 at 00.14.53.png"/>
           <p:cNvPicPr>
             <a:picLocks noChangeAspect="1"/>
           </p:cNvPicPr>
@@ -4507,8 +4482,38 @@
         </p:blipFill>
         <p:spPr>
           <a:xfrm>
-            <a:off x="6019789" y="1133499"/>
-            <a:ext cx="3061892" cy="5193806"/>
+            <a:off x="6059484" y="1109113"/>
+            <a:ext cx="3061891" cy="5193806"/>
+          </a:xfrm>
+          <a:prstGeom prst="rect">
+            <a:avLst/>
+          </a:prstGeom>
+          <a:ln w="12700">
+            <a:miter lim="400000"/>
+          </a:ln>
+        </p:spPr>
+      </p:pic>
+      <p:pic>
+        <p:nvPicPr>
+          <p:cNvPr id="76" name="Screen Shot 2017-09-07 at 15.50.21.png" descr="Screen Shot 2017-09-07 at 15.50.21.png"/>
+          <p:cNvPicPr>
+            <a:picLocks noChangeAspect="1"/>
+          </p:cNvPicPr>
+          <p:nvPr/>
+        </p:nvPicPr>
+        <p:blipFill>
+          <a:blip r:embed="rId9">
+            <a:extLst/>
+          </a:blip>
+          <a:srcRect l="0" t="0" r="0" b="10187"/>
+          <a:stretch>
+            <a:fillRect/>
+          </a:stretch>
+        </p:blipFill>
+        <p:spPr>
+          <a:xfrm>
+            <a:off x="5906048" y="1061229"/>
+            <a:ext cx="3341250" cy="5263671"/>
           </a:xfrm>
           <a:prstGeom prst="rect">
             <a:avLst/>
@@ -4557,7 +4562,7 @@
                                       <p:cBhvr>
                                         <p:cTn id="6" fill="hold"/>
                                         <p:tgtEl>
-                                          <p:spTgt spid="69">
+                                          <p:spTgt spid="68">
                                             <p:bg/>
                                           </p:spTgt>
                                         </p:tgtEl>
@@ -4585,7 +4590,7 @@
                                       <p:cBhvr>
                                         <p:cTn id="8" fill="hold"/>
                                         <p:tgtEl>
-                                          <p:spTgt spid="69">
+                                          <p:spTgt spid="68">
                                             <p:txEl>
                                               <p:pRg st="0" end="0"/>
                                             </p:txEl>
@@ -4633,7 +4638,7 @@
                                       <p:cBhvr>
                                         <p:cTn id="12" fill="hold"/>
                                         <p:tgtEl>
-                                          <p:spTgt spid="70"/>
+                                          <p:spTgt spid="69"/>
                                         </p:tgtEl>
                                         <p:attrNameLst>
                                           <p:attrName>style.visibility</p:attrName>
@@ -4677,7 +4682,7 @@
                                       <p:cBhvr>
                                         <p:cTn id="16" fill="hold"/>
                                         <p:tgtEl>
-                                          <p:spTgt spid="69">
+                                          <p:spTgt spid="68">
                                             <p:txEl>
                                               <p:pRg st="1" end="1"/>
                                             </p:txEl>
@@ -4725,7 +4730,7 @@
                                       <p:cBhvr>
                                         <p:cTn id="20" fill="hold"/>
                                         <p:tgtEl>
-                                          <p:spTgt spid="71"/>
+                                          <p:spTgt spid="70"/>
                                         </p:tgtEl>
                                         <p:attrNameLst>
                                           <p:attrName>style.visibility</p:attrName>
@@ -4769,7 +4774,7 @@
                                       <p:cBhvr>
                                         <p:cTn id="24" fill="hold"/>
                                         <p:tgtEl>
-                                          <p:spTgt spid="69">
+                                          <p:spTgt spid="68">
                                             <p:txEl>
                                               <p:pRg st="2" end="2"/>
                                             </p:txEl>
@@ -4817,7 +4822,7 @@
                                       <p:cBhvr>
                                         <p:cTn id="28" fill="hold"/>
                                         <p:tgtEl>
-                                          <p:spTgt spid="72"/>
+                                          <p:spTgt spid="71"/>
                                         </p:tgtEl>
                                         <p:attrNameLst>
                                           <p:attrName>style.visibility</p:attrName>
@@ -4861,7 +4866,7 @@
                                       <p:cBhvr>
                                         <p:cTn id="32" fill="hold"/>
                                         <p:tgtEl>
-                                          <p:spTgt spid="69">
+                                          <p:spTgt spid="68">
                                             <p:txEl>
                                               <p:pRg st="3" end="3"/>
                                             </p:txEl>
@@ -4909,7 +4914,7 @@
                                       <p:cBhvr>
                                         <p:cTn id="36" fill="hold"/>
                                         <p:tgtEl>
-                                          <p:spTgt spid="73"/>
+                                          <p:spTgt spid="72"/>
                                         </p:tgtEl>
                                         <p:attrNameLst>
                                           <p:attrName>style.visibility</p:attrName>
@@ -4953,7 +4958,7 @@
                                       <p:cBhvr>
                                         <p:cTn id="40" fill="hold"/>
                                         <p:tgtEl>
-                                          <p:spTgt spid="69">
+                                          <p:spTgt spid="68">
                                             <p:txEl>
                                               <p:pRg st="4" end="4"/>
                                             </p:txEl>
@@ -5001,7 +5006,7 @@
                                       <p:cBhvr>
                                         <p:cTn id="44" fill="hold"/>
                                         <p:tgtEl>
-                                          <p:spTgt spid="74"/>
+                                          <p:spTgt spid="73"/>
                                         </p:tgtEl>
                                         <p:attrNameLst>
                                           <p:attrName>style.visibility</p:attrName>
@@ -5045,7 +5050,7 @@
                                       <p:cBhvr>
                                         <p:cTn id="48" fill="hold"/>
                                         <p:tgtEl>
-                                          <p:spTgt spid="69">
+                                          <p:spTgt spid="68">
                                             <p:txEl>
                                               <p:pRg st="5" end="5"/>
                                             </p:txEl>
@@ -5093,7 +5098,7 @@
                                       <p:cBhvr>
                                         <p:cTn id="52" fill="hold"/>
                                         <p:tgtEl>
-                                          <p:spTgt spid="75"/>
+                                          <p:spTgt spid="74"/>
                                         </p:tgtEl>
                                         <p:attrNameLst>
                                           <p:attrName>style.visibility</p:attrName>
@@ -5137,7 +5142,7 @@
                                       <p:cBhvr>
                                         <p:cTn id="56" fill="hold"/>
                                         <p:tgtEl>
-                                          <p:spTgt spid="69">
+                                          <p:spTgt spid="68">
                                             <p:txEl>
                                               <p:pRg st="6" end="6"/>
                                             </p:txEl>
@@ -5185,6 +5190,98 @@
                                       <p:cBhvr>
                                         <p:cTn id="60" fill="hold"/>
                                         <p:tgtEl>
+                                          <p:spTgt spid="75"/>
+                                        </p:tgtEl>
+                                        <p:attrNameLst>
+                                          <p:attrName>style.visibility</p:attrName>
+                                        </p:attrNameLst>
+                                      </p:cBhvr>
+                                      <p:to>
+                                        <p:strVal val="visible"/>
+                                      </p:to>
+                                    </p:set>
+                                  </p:childTnLst>
+                                </p:cTn>
+                              </p:par>
+                            </p:childTnLst>
+                          </p:cTn>
+                        </p:par>
+                      </p:childTnLst>
+                    </p:cTn>
+                  </p:par>
+                  <p:par>
+                    <p:cTn id="61" fill="hold">
+                      <p:stCondLst>
+                        <p:cond delay="indefinite"/>
+                      </p:stCondLst>
+                      <p:childTnLst>
+                        <p:par>
+                          <p:cTn id="62" fill="hold">
+                            <p:stCondLst>
+                              <p:cond delay="0"/>
+                            </p:stCondLst>
+                            <p:childTnLst>
+                              <p:par>
+                                <p:cTn id="63" presetClass="entr" nodeType="clickEffect" presetSubtype="0" presetID="1" grpId="1" fill="hold">
+                                  <p:stCondLst>
+                                    <p:cond delay="0"/>
+                                  </p:stCondLst>
+                                  <p:iterate type="el" backwards="0">
+                                    <p:tmAbs val="0"/>
+                                  </p:iterate>
+                                  <p:childTnLst>
+                                    <p:set>
+                                      <p:cBhvr>
+                                        <p:cTn id="64" fill="hold"/>
+                                        <p:tgtEl>
+                                          <p:spTgt spid="68">
+                                            <p:txEl>
+                                              <p:pRg st="7" end="7"/>
+                                            </p:txEl>
+                                          </p:spTgt>
+                                        </p:tgtEl>
+                                        <p:attrNameLst>
+                                          <p:attrName>style.visibility</p:attrName>
+                                        </p:attrNameLst>
+                                      </p:cBhvr>
+                                      <p:to>
+                                        <p:strVal val="visible"/>
+                                      </p:to>
+                                    </p:set>
+                                  </p:childTnLst>
+                                </p:cTn>
+                              </p:par>
+                            </p:childTnLst>
+                          </p:cTn>
+                        </p:par>
+                      </p:childTnLst>
+                    </p:cTn>
+                  </p:par>
+                  <p:par>
+                    <p:cTn id="65" fill="hold">
+                      <p:stCondLst>
+                        <p:cond delay="indefinite"/>
+                      </p:stCondLst>
+                      <p:childTnLst>
+                        <p:par>
+                          <p:cTn id="66" fill="hold">
+                            <p:stCondLst>
+                              <p:cond delay="0"/>
+                            </p:stCondLst>
+                            <p:childTnLst>
+                              <p:par>
+                                <p:cTn id="67" presetClass="entr" nodeType="clickEffect" presetSubtype="0" presetID="1" grpId="9" fill="hold">
+                                  <p:stCondLst>
+                                    <p:cond delay="0"/>
+                                  </p:stCondLst>
+                                  <p:iterate type="el" backwards="0">
+                                    <p:tmAbs val="0"/>
+                                  </p:iterate>
+                                  <p:childTnLst>
+                                    <p:set>
+                                      <p:cBhvr>
+                                        <p:cTn id="68" fill="hold"/>
+                                        <p:tgtEl>
                                           <p:spTgt spid="76"/>
                                         </p:tgtEl>
                                         <p:attrNameLst>
@@ -5226,14 +5323,15 @@
       </p:par>
     </p:tnLst>
     <p:bldLst>
-      <p:bldP build="whole" bldLvl="1" animBg="1" rev="0" advAuto="0" spid="70" grpId="2"/>
-      <p:bldP build="p" bldLvl="5" animBg="1" rev="0" advAuto="0" spid="69" grpId="1"/>
-      <p:bldP build="whole" bldLvl="1" animBg="1" rev="0" advAuto="0" spid="75" grpId="7"/>
-      <p:bldP build="whole" bldLvl="1" animBg="1" rev="0" advAuto="0" spid="71" grpId="3"/>
-      <p:bldP build="whole" bldLvl="1" animBg="1" rev="0" advAuto="0" spid="74" grpId="6"/>
-      <p:bldP build="whole" bldLvl="1" animBg="1" rev="0" advAuto="0" spid="72" grpId="4"/>
-      <p:bldP build="whole" bldLvl="1" animBg="1" rev="0" advAuto="0" spid="73" grpId="5"/>
-      <p:bldP build="whole" bldLvl="1" animBg="1" rev="0" advAuto="0" spid="76" grpId="8"/>
+      <p:bldP build="whole" bldLvl="1" animBg="1" rev="0" advAuto="0" spid="73" grpId="6"/>
+      <p:bldP build="p" bldLvl="5" animBg="1" rev="0" advAuto="0" spid="68" grpId="1"/>
+      <p:bldP build="whole" bldLvl="1" animBg="1" rev="0" advAuto="0" spid="69" grpId="2"/>
+      <p:bldP build="whole" bldLvl="1" animBg="1" rev="0" advAuto="0" spid="75" grpId="8"/>
+      <p:bldP build="whole" bldLvl="1" animBg="1" rev="0" advAuto="0" spid="70" grpId="3"/>
+      <p:bldP build="whole" bldLvl="1" animBg="1" rev="0" advAuto="0" spid="74" grpId="7"/>
+      <p:bldP build="whole" bldLvl="1" animBg="1" rev="0" advAuto="0" spid="76" grpId="9"/>
+      <p:bldP build="whole" bldLvl="1" animBg="1" rev="0" advAuto="0" spid="71" grpId="4"/>
+      <p:bldP build="whole" bldLvl="1" animBg="1" rev="0" advAuto="0" spid="72" grpId="5"/>
     </p:bldLst>
   </p:timing>
 </p:sld>

</xml_diff>